<commit_message>
Corrige PPT concernant les fichiers du tutoriel
</commit_message>
<xml_diff>
--- a/R NG_Lab Intro et tutoriel SAE3D 202207.pptx
+++ b/R NG_Lab Intro et tutoriel SAE3D 202207.pptx
@@ -215,7 +215,7 @@
   <pc:docChgLst>
     <pc:chgData name="Quoc Dinh Nguyen" userId="16b7a7d6af99dc0b" providerId="LiveId" clId="{7C4AEB8B-CB12-404D-A94D-E8BAADD98627}"/>
     <pc:docChg chg="undo custSel addSld delSld modSld sldOrd modMainMaster addSection delSection modSection">
-      <pc:chgData name="Quoc Dinh Nguyen" userId="16b7a7d6af99dc0b" providerId="LiveId" clId="{7C4AEB8B-CB12-404D-A94D-E8BAADD98627}" dt="2022-07-13T14:01:03.921" v="18959" actId="1076"/>
+      <pc:chgData name="Quoc Dinh Nguyen" userId="16b7a7d6af99dc0b" providerId="LiveId" clId="{7C4AEB8B-CB12-404D-A94D-E8BAADD98627}" dt="2022-07-13T14:22:27.346" v="19032" actId="20577"/>
       <pc:docMkLst>
         <pc:docMk/>
       </pc:docMkLst>
@@ -1521,7 +1521,7 @@
         </pc:graphicFrameChg>
       </pc:sldChg>
       <pc:sldChg chg="addSp modSp new mod">
-        <pc:chgData name="Quoc Dinh Nguyen" userId="16b7a7d6af99dc0b" providerId="LiveId" clId="{7C4AEB8B-CB12-404D-A94D-E8BAADD98627}" dt="2022-07-12T01:45:47.707" v="14563" actId="403"/>
+        <pc:chgData name="Quoc Dinh Nguyen" userId="16b7a7d6af99dc0b" providerId="LiveId" clId="{7C4AEB8B-CB12-404D-A94D-E8BAADD98627}" dt="2022-07-13T14:22:27.346" v="19032" actId="20577"/>
         <pc:sldMkLst>
           <pc:docMk/>
           <pc:sldMk cId="3837207228" sldId="290"/>
@@ -1535,7 +1535,7 @@
           </ac:spMkLst>
         </pc:spChg>
         <pc:spChg chg="mod">
-          <ac:chgData name="Quoc Dinh Nguyen" userId="16b7a7d6af99dc0b" providerId="LiveId" clId="{7C4AEB8B-CB12-404D-A94D-E8BAADD98627}" dt="2022-07-12T01:45:47.707" v="14563" actId="403"/>
+          <ac:chgData name="Quoc Dinh Nguyen" userId="16b7a7d6af99dc0b" providerId="LiveId" clId="{7C4AEB8B-CB12-404D-A94D-E8BAADD98627}" dt="2022-07-13T14:22:27.346" v="19032" actId="20577"/>
           <ac:spMkLst>
             <pc:docMk/>
             <pc:sldMk cId="3837207228" sldId="290"/>
@@ -7009,24 +7009,19 @@
           <a:p>
             <a:r>
               <a:rPr lang="fr-CA" sz="2400" dirty="0"/>
-              <a:t>Les instructions et les données (simulées!) sont dans le R </a:t>
-            </a:r>
-            <a:r>
-              <a:rPr lang="fr-CA" sz="2400" dirty="0" err="1"/>
-              <a:t>Markdown</a:t>
-            </a:r>
+              <a:t>Les instructions sont dans le HTML</a:t>
+            </a:r>
+          </a:p>
+          <a:p>
             <a:r>
               <a:rPr lang="fr-CA" sz="2400" dirty="0"/>
-              <a:t> </a:t>
-            </a:r>
-          </a:p>
-          <a:p>
-            <a:pPr lvl="1"/>
-            <a:r>
-              <a:rPr lang="fr-CA" sz="2000" dirty="0"/>
-              <a:t>LIEN</a:t>
-            </a:r>
-            <a:endParaRPr lang="en-CA" sz="2000" dirty="0"/>
+              <a:t>Les données (simulées!) sont </a:t>
+            </a:r>
+            <a:r>
+              <a:rPr lang="fr-CA" sz="2400"/>
+              <a:t>en CSV</a:t>
+            </a:r>
+            <a:endParaRPr lang="fr-CA" sz="2400" dirty="0"/>
           </a:p>
         </p:txBody>
       </p:sp>

</xml_diff>

<commit_message>
Corrige le nom des fichiers dans le PPT
</commit_message>
<xml_diff>
--- a/R NG_Lab Intro et tutoriel SAE3D 202207.pptx
+++ b/R NG_Lab Intro et tutoriel SAE3D 202207.pptx
@@ -212,6 +212,38 @@
 
 <file path=ppt/changesInfos/changesInfo1.xml><?xml version="1.0" encoding="utf-8"?>
 <pc:chgInfo xmlns:a="http://schemas.openxmlformats.org/drawingml/2006/main" xmlns:r="http://schemas.openxmlformats.org/officeDocument/2006/relationships" xmlns:ac="http://schemas.microsoft.com/office/drawing/2013/main/command" xmlns:pc="http://schemas.microsoft.com/office/powerpoint/2013/main/command">
+  <pc:docChgLst>
+    <pc:chgData name="Quoc Dinh Nguyen" userId="0a931ee7-7c83-4f6c-8293-007a53aa21c1" providerId="ADAL" clId="{8C53780E-20DA-4E48-A7B1-42DFFA8EC2CF}"/>
+    <pc:docChg chg="undo custSel modSld">
+      <pc:chgData name="Quoc Dinh Nguyen" userId="0a931ee7-7c83-4f6c-8293-007a53aa21c1" providerId="ADAL" clId="{8C53780E-20DA-4E48-A7B1-42DFFA8EC2CF}" dt="2022-07-13T14:30:12.118" v="122" actId="1076"/>
+      <pc:docMkLst>
+        <pc:docMk/>
+      </pc:docMkLst>
+      <pc:sldChg chg="modSp mod">
+        <pc:chgData name="Quoc Dinh Nguyen" userId="0a931ee7-7c83-4f6c-8293-007a53aa21c1" providerId="ADAL" clId="{8C53780E-20DA-4E48-A7B1-42DFFA8EC2CF}" dt="2022-07-13T14:30:12.118" v="122" actId="1076"/>
+        <pc:sldMkLst>
+          <pc:docMk/>
+          <pc:sldMk cId="3837207228" sldId="290"/>
+        </pc:sldMkLst>
+        <pc:spChg chg="mod">
+          <ac:chgData name="Quoc Dinh Nguyen" userId="0a931ee7-7c83-4f6c-8293-007a53aa21c1" providerId="ADAL" clId="{8C53780E-20DA-4E48-A7B1-42DFFA8EC2CF}" dt="2022-07-13T14:29:57.766" v="121" actId="20577"/>
+          <ac:spMkLst>
+            <pc:docMk/>
+            <pc:sldMk cId="3837207228" sldId="290"/>
+            <ac:spMk id="3" creationId="{7FB065D5-C473-B937-8913-D97A422DC399}"/>
+          </ac:spMkLst>
+        </pc:spChg>
+        <pc:picChg chg="mod">
+          <ac:chgData name="Quoc Dinh Nguyen" userId="0a931ee7-7c83-4f6c-8293-007a53aa21c1" providerId="ADAL" clId="{8C53780E-20DA-4E48-A7B1-42DFFA8EC2CF}" dt="2022-07-13T14:30:12.118" v="122" actId="1076"/>
+          <ac:picMkLst>
+            <pc:docMk/>
+            <pc:sldMk cId="3837207228" sldId="290"/>
+            <ac:picMk id="6" creationId="{FA4CDC76-78D1-E3C3-A970-811A0FF12BF6}"/>
+          </ac:picMkLst>
+        </pc:picChg>
+      </pc:sldChg>
+    </pc:docChg>
+  </pc:docChgLst>
   <pc:docChgLst>
     <pc:chgData name="Quoc Dinh Nguyen" userId="16b7a7d6af99dc0b" providerId="LiveId" clId="{7C4AEB8B-CB12-404D-A94D-E8BAADD98627}"/>
     <pc:docChg chg="undo custSel addSld delSld modSld sldOrd modMainMaster addSection delSection modSection">
@@ -7002,26 +7034,57 @@
           <a:p>
             <a:pPr lvl="1"/>
             <a:r>
-              <a:rPr lang="fr-CA" sz="2000" dirty="0"/>
-              <a:t>LIEN</a:t>
-            </a:r>
+              <a:rPr lang="fr-FR" sz="2000" i="1" dirty="0"/>
+              <a:t>R </a:t>
+            </a:r>
+            <a:r>
+              <a:rPr lang="fr-FR" sz="2000" i="1" dirty="0" err="1"/>
+              <a:t>NG_Lab</a:t>
+            </a:r>
+            <a:r>
+              <a:rPr lang="fr-FR" sz="2000" i="1" dirty="0"/>
+              <a:t> - Tutoriel et résultat SAE3D.pdf</a:t>
+            </a:r>
+            <a:endParaRPr lang="fr-CA" sz="2000" i="1" dirty="0"/>
           </a:p>
           <a:p>
             <a:r>
               <a:rPr lang="fr-CA" sz="2400" dirty="0"/>
-              <a:t>Les instructions sont dans le HTML</a:t>
+              <a:t>Les instructions :</a:t>
+            </a:r>
+          </a:p>
+          <a:p>
+            <a:pPr lvl="1"/>
+            <a:r>
+              <a:rPr lang="fr-CA" sz="2000" i="1" dirty="0"/>
+              <a:t>sae3d_tutorial.html</a:t>
             </a:r>
           </a:p>
           <a:p>
             <a:r>
               <a:rPr lang="fr-CA" sz="2400" dirty="0"/>
-              <a:t>Les données (simulées!) sont </a:t>
-            </a:r>
-            <a:r>
-              <a:rPr lang="fr-CA" sz="2400"/>
-              <a:t>en CSV</a:t>
-            </a:r>
-            <a:endParaRPr lang="fr-CA" sz="2400" dirty="0"/>
+              <a:t>Les données (simulées!) :</a:t>
+            </a:r>
+          </a:p>
+          <a:p>
+            <a:pPr lvl="1"/>
+            <a:r>
+              <a:rPr lang="fr-CA" sz="2000" i="1" dirty="0"/>
+              <a:t>sae3d.csv</a:t>
+            </a:r>
+          </a:p>
+          <a:p>
+            <a:r>
+              <a:rPr lang="fr-CA" sz="2400" dirty="0"/>
+              <a:t>Le code en exemple :</a:t>
+            </a:r>
+          </a:p>
+          <a:p>
+            <a:pPr lvl="1"/>
+            <a:r>
+              <a:rPr lang="fr-CA" sz="2000" i="1" dirty="0"/>
+              <a:t>Diapos subséquentes</a:t>
+            </a:r>
           </a:p>
         </p:txBody>
       </p:sp>
@@ -7076,7 +7139,7 @@
         </p:blipFill>
         <p:spPr>
           <a:xfrm>
-            <a:off x="5384250" y="1773714"/>
+            <a:off x="5425729" y="1825625"/>
             <a:ext cx="6452699" cy="3539540"/>
           </a:xfrm>
           <a:prstGeom prst="rect">

</xml_diff>

<commit_message>
Corrige fichier dans PPT
</commit_message>
<xml_diff>
--- a/R NG_Lab Intro et tutoriel SAE3D 202207.pptx
+++ b/R NG_Lab Intro et tutoriel SAE3D 202207.pptx
@@ -212,6 +212,30 @@
 
 <file path=ppt/changesInfos/changesInfo1.xml><?xml version="1.0" encoding="utf-8"?>
 <pc:chgInfo xmlns:a="http://schemas.openxmlformats.org/drawingml/2006/main" xmlns:r="http://schemas.openxmlformats.org/officeDocument/2006/relationships" xmlns:ac="http://schemas.microsoft.com/office/drawing/2013/main/command" xmlns:pc="http://schemas.microsoft.com/office/powerpoint/2013/main/command">
+  <pc:docChgLst>
+    <pc:chgData name="Quoc Dinh Nguyen" userId="0a931ee7-7c83-4f6c-8293-007a53aa21c1" providerId="ADAL" clId="{6B4C1C4A-9D55-4BE5-93E1-C6919D9C8C58}"/>
+    <pc:docChg chg="modSld">
+      <pc:chgData name="Quoc Dinh Nguyen" userId="0a931ee7-7c83-4f6c-8293-007a53aa21c1" providerId="ADAL" clId="{6B4C1C4A-9D55-4BE5-93E1-C6919D9C8C58}" dt="2022-07-13T14:33:06.812" v="0" actId="20577"/>
+      <pc:docMkLst>
+        <pc:docMk/>
+      </pc:docMkLst>
+      <pc:sldChg chg="modSp mod">
+        <pc:chgData name="Quoc Dinh Nguyen" userId="0a931ee7-7c83-4f6c-8293-007a53aa21c1" providerId="ADAL" clId="{6B4C1C4A-9D55-4BE5-93E1-C6919D9C8C58}" dt="2022-07-13T14:33:06.812" v="0" actId="20577"/>
+        <pc:sldMkLst>
+          <pc:docMk/>
+          <pc:sldMk cId="2553023193" sldId="256"/>
+        </pc:sldMkLst>
+        <pc:spChg chg="mod">
+          <ac:chgData name="Quoc Dinh Nguyen" userId="0a931ee7-7c83-4f6c-8293-007a53aa21c1" providerId="ADAL" clId="{6B4C1C4A-9D55-4BE5-93E1-C6919D9C8C58}" dt="2022-07-13T14:33:06.812" v="0" actId="20577"/>
+          <ac:spMkLst>
+            <pc:docMk/>
+            <pc:sldMk cId="2553023193" sldId="256"/>
+            <ac:spMk id="3" creationId="{E5CFC2C3-4026-4F66-A28B-762B957AE782}"/>
+          </ac:spMkLst>
+        </pc:spChg>
+      </pc:sldChg>
+    </pc:docChg>
+  </pc:docChgLst>
   <pc:docChgLst>
     <pc:chgData name="Quoc Dinh Nguyen" userId="0a931ee7-7c83-4f6c-8293-007a53aa21c1" providerId="ADAL" clId="{8C53780E-20DA-4E48-A7B1-42DFFA8EC2CF}"/>
     <pc:docChg chg="undo custSel modSld">
@@ -5694,9 +5718,10 @@
           <a:lstStyle/>
           <a:p>
             <a:r>
-              <a:rPr lang="fr-CA" dirty="0"/>
-              <a:t>Juillet 2022</a:t>
-            </a:r>
+              <a:rPr lang="fr-CA"/>
+              <a:t>Juillet 2022 </a:t>
+            </a:r>
+            <a:endParaRPr lang="fr-CA" dirty="0"/>
           </a:p>
           <a:p>
             <a:r>

</xml_diff>